<commit_message>
Updating Lesson 27 schematic one last time and adding more slides.
</commit_message>
<xml_diff>
--- a/notes/L27/Lsn27.pptx
+++ b/notes/L27/Lsn27.pptx
@@ -5,10 +5,10 @@
     <p:sldMasterId id="2147483648" r:id="rId1"/>
   </p:sldMasterIdLst>
   <p:notesMasterIdLst>
-    <p:notesMasterId r:id="rId10"/>
+    <p:notesMasterId r:id="rId13"/>
   </p:notesMasterIdLst>
   <p:handoutMasterIdLst>
-    <p:handoutMasterId r:id="rId11"/>
+    <p:handoutMasterId r:id="rId14"/>
   </p:handoutMasterIdLst>
   <p:sldIdLst>
     <p:sldId id="282" r:id="rId2"/>
@@ -19,6 +19,9 @@
     <p:sldId id="481" r:id="rId7"/>
     <p:sldId id="485" r:id="rId8"/>
     <p:sldId id="486" r:id="rId9"/>
+    <p:sldId id="488" r:id="rId10"/>
+    <p:sldId id="487" r:id="rId11"/>
+    <p:sldId id="489" r:id="rId12"/>
   </p:sldIdLst>
   <p:sldSz cx="9144000" cy="6858000" type="screen4x3"/>
   <p:notesSz cx="6985000" cy="9283700"/>
@@ -3993,6 +3996,442 @@
 </p:sld>
 </file>
 
+<file path=ppt/slides/slide10.xml><?xml version="1.0" encoding="utf-8"?>
+<p:sld xmlns:a="http://schemas.openxmlformats.org/drawingml/2006/main" xmlns:r="http://schemas.openxmlformats.org/officeDocument/2006/relationships" xmlns:p="http://schemas.openxmlformats.org/presentationml/2006/main">
+  <p:cSld>
+    <p:spTree>
+      <p:nvGrpSpPr>
+        <p:cNvPr id="1" name=""/>
+        <p:cNvGrpSpPr/>
+        <p:nvPr/>
+      </p:nvGrpSpPr>
+      <p:grpSpPr>
+        <a:xfrm>
+          <a:off x="0" y="0"/>
+          <a:ext cx="0" cy="0"/>
+          <a:chOff x="0" y="0"/>
+          <a:chExt cx="0" cy="0"/>
+        </a:xfrm>
+      </p:grpSpPr>
+      <p:sp>
+        <p:nvSpPr>
+          <p:cNvPr id="2" name="Title 1"/>
+          <p:cNvSpPr>
+            <a:spLocks noGrp="1"/>
+          </p:cNvSpPr>
+          <p:nvPr>
+            <p:ph type="title"/>
+          </p:nvPr>
+        </p:nvSpPr>
+        <p:spPr/>
+        <p:txBody>
+          <a:bodyPr/>
+          <a:lstStyle/>
+          <a:p>
+            <a:r>
+              <a:rPr lang="en-US" dirty="0" smtClean="0"/>
+              <a:t>In-Class Programming Exercise </a:t>
+            </a:r>
+            <a:endParaRPr lang="en-US" dirty="0"/>
+          </a:p>
+        </p:txBody>
+      </p:sp>
+      <p:sp>
+        <p:nvSpPr>
+          <p:cNvPr id="3" name="Content Placeholder 2"/>
+          <p:cNvSpPr>
+            <a:spLocks noGrp="1"/>
+          </p:cNvSpPr>
+          <p:nvPr>
+            <p:ph idx="1"/>
+          </p:nvPr>
+        </p:nvSpPr>
+        <p:spPr/>
+        <p:txBody>
+          <a:bodyPr/>
+          <a:lstStyle/>
+          <a:p>
+            <a:endParaRPr lang="en-US" sz="1800" dirty="0"/>
+          </a:p>
+        </p:txBody>
+      </p:sp>
+      <p:sp>
+        <p:nvSpPr>
+          <p:cNvPr id="4" name="Rectangle 3"/>
+          <p:cNvSpPr/>
+          <p:nvPr/>
+        </p:nvSpPr>
+        <p:spPr>
+          <a:xfrm>
+            <a:off x="3141480" y="659685"/>
+            <a:ext cx="2861040" cy="461665"/>
+          </a:xfrm>
+          <a:prstGeom prst="rect">
+            <a:avLst/>
+          </a:prstGeom>
+        </p:spPr>
+        <p:txBody>
+          <a:bodyPr wrap="none">
+            <a:spAutoFit/>
+          </a:bodyPr>
+          <a:lstStyle/>
+          <a:p>
+            <a:r>
+              <a:rPr lang="en-US" dirty="0"/>
+              <a:t>(see </a:t>
+            </a:r>
+            <a:r>
+              <a:rPr lang="en-US" dirty="0" err="1"/>
+              <a:t>interruptTones.c</a:t>
+            </a:r>
+            <a:r>
+              <a:rPr lang="en-US" dirty="0"/>
+              <a:t>)</a:t>
+            </a:r>
+          </a:p>
+        </p:txBody>
+      </p:sp>
+      <p:sp>
+        <p:nvSpPr>
+          <p:cNvPr id="7" name="Rectangle 6"/>
+          <p:cNvSpPr/>
+          <p:nvPr/>
+        </p:nvSpPr>
+        <p:spPr>
+          <a:xfrm>
+            <a:off x="0" y="6172174"/>
+            <a:ext cx="9144000" cy="707886"/>
+          </a:xfrm>
+          <a:prstGeom prst="rect">
+            <a:avLst/>
+          </a:prstGeom>
+        </p:spPr>
+        <p:txBody>
+          <a:bodyPr wrap="square">
+            <a:spAutoFit/>
+          </a:bodyPr>
+          <a:lstStyle/>
+          <a:p>
+            <a:pPr algn="ctr">
+              <a:spcBef>
+                <a:spcPts val="0"/>
+              </a:spcBef>
+            </a:pPr>
+            <a:r>
+              <a:rPr lang="en-US" sz="2000" dirty="0"/>
+              <a:t>Setup for the hooking up 3.5mm Audio Jack to the MSP430 Launchpad </a:t>
+            </a:r>
+            <a:r>
+              <a:rPr lang="en-US" sz="2000" dirty="0" smtClean="0"/>
+              <a:t>Board</a:t>
+            </a:r>
+          </a:p>
+          <a:p>
+            <a:pPr algn="ctr">
+              <a:spcBef>
+                <a:spcPts val="0"/>
+              </a:spcBef>
+            </a:pPr>
+            <a:r>
+              <a:rPr lang="en-US" sz="2000" dirty="0" smtClean="0"/>
+              <a:t>with Volume Control</a:t>
+            </a:r>
+            <a:endParaRPr lang="en-US" sz="2000" dirty="0"/>
+          </a:p>
+        </p:txBody>
+      </p:sp>
+      <p:pic>
+        <p:nvPicPr>
+          <p:cNvPr id="8" name="Picture 2"/>
+          <p:cNvPicPr>
+            <a:picLocks noChangeAspect="1" noChangeArrowheads="1"/>
+          </p:cNvPicPr>
+          <p:nvPr/>
+        </p:nvPicPr>
+        <p:blipFill>
+          <a:blip r:embed="rId2">
+            <a:extLst>
+              <a:ext uri="{28A0092B-C50C-407E-A947-70E740481C1C}">
+                <a14:useLocalDpi xmlns:a14="http://schemas.microsoft.com/office/drawing/2010/main" val="0"/>
+              </a:ext>
+            </a:extLst>
+          </a:blip>
+          <a:srcRect/>
+          <a:stretch>
+            <a:fillRect/>
+          </a:stretch>
+        </p:blipFill>
+        <p:spPr bwMode="auto">
+          <a:xfrm>
+            <a:off x="354251" y="1377857"/>
+            <a:ext cx="8435498" cy="4757392"/>
+          </a:xfrm>
+          <a:prstGeom prst="rect">
+            <a:avLst/>
+          </a:prstGeom>
+          <a:noFill/>
+          <a:ln>
+            <a:noFill/>
+          </a:ln>
+          <a:extLst>
+            <a:ext uri="{909E8E84-426E-40DD-AFC4-6F175D3DCCD1}">
+              <a14:hiddenFill xmlns:a14="http://schemas.microsoft.com/office/drawing/2010/main">
+                <a:solidFill>
+                  <a:schemeClr val="accent1"/>
+                </a:solidFill>
+              </a14:hiddenFill>
+            </a:ext>
+            <a:ext uri="{91240B29-F687-4F45-9708-019B960494DF}">
+              <a14:hiddenLine xmlns:a14="http://schemas.microsoft.com/office/drawing/2010/main" w="9525">
+                <a:solidFill>
+                  <a:schemeClr val="tx1"/>
+                </a:solidFill>
+                <a:miter lim="800000"/>
+                <a:headEnd/>
+                <a:tailEnd/>
+              </a14:hiddenLine>
+            </a:ext>
+          </a:extLst>
+        </p:spPr>
+      </p:pic>
+    </p:spTree>
+    <p:extLst>
+      <p:ext uri="{BB962C8B-B14F-4D97-AF65-F5344CB8AC3E}">
+        <p14:creationId xmlns:p14="http://schemas.microsoft.com/office/powerpoint/2010/main" val="1972027487"/>
+      </p:ext>
+    </p:extLst>
+  </p:cSld>
+  <p:clrMapOvr>
+    <a:masterClrMapping/>
+  </p:clrMapOvr>
+  <p:timing>
+    <p:tnLst>
+      <p:par>
+        <p:cTn id="1" dur="indefinite" restart="never" nodeType="tmRoot"/>
+      </p:par>
+    </p:tnLst>
+  </p:timing>
+</p:sld>
+</file>
+
+<file path=ppt/slides/slide11.xml><?xml version="1.0" encoding="utf-8"?>
+<p:sld xmlns:a="http://schemas.openxmlformats.org/drawingml/2006/main" xmlns:r="http://schemas.openxmlformats.org/officeDocument/2006/relationships" xmlns:p="http://schemas.openxmlformats.org/presentationml/2006/main">
+  <p:cSld>
+    <p:spTree>
+      <p:nvGrpSpPr>
+        <p:cNvPr id="1" name=""/>
+        <p:cNvGrpSpPr/>
+        <p:nvPr/>
+      </p:nvGrpSpPr>
+      <p:grpSpPr>
+        <a:xfrm>
+          <a:off x="0" y="0"/>
+          <a:ext cx="0" cy="0"/>
+          <a:chOff x="0" y="0"/>
+          <a:chExt cx="0" cy="0"/>
+        </a:xfrm>
+      </p:grpSpPr>
+      <p:sp>
+        <p:nvSpPr>
+          <p:cNvPr id="2" name="Title 1"/>
+          <p:cNvSpPr>
+            <a:spLocks noGrp="1"/>
+          </p:cNvSpPr>
+          <p:nvPr>
+            <p:ph type="title"/>
+          </p:nvPr>
+        </p:nvSpPr>
+        <p:spPr/>
+        <p:txBody>
+          <a:bodyPr/>
+          <a:lstStyle/>
+          <a:p>
+            <a:r>
+              <a:rPr lang="en-US" dirty="0" smtClean="0"/>
+              <a:t>In-Class Programming Exercise </a:t>
+            </a:r>
+            <a:endParaRPr lang="en-US" dirty="0"/>
+          </a:p>
+        </p:txBody>
+      </p:sp>
+      <p:sp>
+        <p:nvSpPr>
+          <p:cNvPr id="3" name="Content Placeholder 2"/>
+          <p:cNvSpPr>
+            <a:spLocks noGrp="1"/>
+          </p:cNvSpPr>
+          <p:nvPr>
+            <p:ph idx="1"/>
+          </p:nvPr>
+        </p:nvSpPr>
+        <p:spPr/>
+        <p:txBody>
+          <a:bodyPr/>
+          <a:lstStyle/>
+          <a:p>
+            <a:endParaRPr lang="en-US" sz="1800" dirty="0"/>
+          </a:p>
+        </p:txBody>
+      </p:sp>
+      <p:sp>
+        <p:nvSpPr>
+          <p:cNvPr id="4" name="Rectangle 3"/>
+          <p:cNvSpPr/>
+          <p:nvPr/>
+        </p:nvSpPr>
+        <p:spPr>
+          <a:xfrm>
+            <a:off x="3141480" y="659685"/>
+            <a:ext cx="2861040" cy="461665"/>
+          </a:xfrm>
+          <a:prstGeom prst="rect">
+            <a:avLst/>
+          </a:prstGeom>
+        </p:spPr>
+        <p:txBody>
+          <a:bodyPr wrap="none">
+            <a:spAutoFit/>
+          </a:bodyPr>
+          <a:lstStyle/>
+          <a:p>
+            <a:r>
+              <a:rPr lang="en-US" dirty="0"/>
+              <a:t>(see </a:t>
+            </a:r>
+            <a:r>
+              <a:rPr lang="en-US" dirty="0" err="1"/>
+              <a:t>interruptTones.c</a:t>
+            </a:r>
+            <a:r>
+              <a:rPr lang="en-US" dirty="0"/>
+              <a:t>)</a:t>
+            </a:r>
+          </a:p>
+        </p:txBody>
+      </p:sp>
+      <p:sp>
+        <p:nvSpPr>
+          <p:cNvPr id="7" name="Rectangle 6"/>
+          <p:cNvSpPr/>
+          <p:nvPr/>
+        </p:nvSpPr>
+        <p:spPr>
+          <a:xfrm>
+            <a:off x="0" y="6172174"/>
+            <a:ext cx="9144000" cy="707886"/>
+          </a:xfrm>
+          <a:prstGeom prst="rect">
+            <a:avLst/>
+          </a:prstGeom>
+        </p:spPr>
+        <p:txBody>
+          <a:bodyPr wrap="square">
+            <a:spAutoFit/>
+          </a:bodyPr>
+          <a:lstStyle/>
+          <a:p>
+            <a:pPr algn="ctr">
+              <a:spcBef>
+                <a:spcPts val="0"/>
+              </a:spcBef>
+            </a:pPr>
+            <a:r>
+              <a:rPr lang="en-US" sz="2000" dirty="0"/>
+              <a:t>Setup for the hooking up 3.5mm Audio Jack to the MSP430 Launchpad </a:t>
+            </a:r>
+            <a:r>
+              <a:rPr lang="en-US" sz="2000" dirty="0" smtClean="0"/>
+              <a:t>Board</a:t>
+            </a:r>
+          </a:p>
+          <a:p>
+            <a:pPr algn="ctr">
+              <a:spcBef>
+                <a:spcPts val="0"/>
+              </a:spcBef>
+            </a:pPr>
+            <a:r>
+              <a:rPr lang="en-US" sz="2000" dirty="0" smtClean="0"/>
+              <a:t>with Volume Control</a:t>
+            </a:r>
+            <a:endParaRPr lang="en-US" sz="2000" dirty="0"/>
+          </a:p>
+        </p:txBody>
+      </p:sp>
+      <p:pic>
+        <p:nvPicPr>
+          <p:cNvPr id="4098" name="Picture 2"/>
+          <p:cNvPicPr>
+            <a:picLocks noChangeAspect="1" noChangeArrowheads="1"/>
+          </p:cNvPicPr>
+          <p:nvPr/>
+        </p:nvPicPr>
+        <p:blipFill>
+          <a:blip r:embed="rId2">
+            <a:extLst>
+              <a:ext uri="{28A0092B-C50C-407E-A947-70E740481C1C}">
+                <a14:useLocalDpi xmlns:a14="http://schemas.microsoft.com/office/drawing/2010/main" val="0"/>
+              </a:ext>
+            </a:extLst>
+          </a:blip>
+          <a:srcRect/>
+          <a:stretch>
+            <a:fillRect/>
+          </a:stretch>
+        </p:blipFill>
+        <p:spPr bwMode="auto">
+          <a:xfrm>
+            <a:off x="407869" y="1660156"/>
+            <a:ext cx="8367642" cy="4274680"/>
+          </a:xfrm>
+          <a:prstGeom prst="rect">
+            <a:avLst/>
+          </a:prstGeom>
+          <a:noFill/>
+          <a:ln>
+            <a:noFill/>
+          </a:ln>
+          <a:extLst>
+            <a:ext uri="{909E8E84-426E-40DD-AFC4-6F175D3DCCD1}">
+              <a14:hiddenFill xmlns:a14="http://schemas.microsoft.com/office/drawing/2010/main">
+                <a:solidFill>
+                  <a:schemeClr val="accent1"/>
+                </a:solidFill>
+              </a14:hiddenFill>
+            </a:ext>
+            <a:ext uri="{91240B29-F687-4F45-9708-019B960494DF}">
+              <a14:hiddenLine xmlns:a14="http://schemas.microsoft.com/office/drawing/2010/main" w="9525">
+                <a:solidFill>
+                  <a:schemeClr val="tx1"/>
+                </a:solidFill>
+                <a:miter lim="800000"/>
+                <a:headEnd/>
+                <a:tailEnd/>
+              </a14:hiddenLine>
+            </a:ext>
+          </a:extLst>
+        </p:spPr>
+      </p:pic>
+    </p:spTree>
+    <p:extLst>
+      <p:ext uri="{BB962C8B-B14F-4D97-AF65-F5344CB8AC3E}">
+        <p14:creationId xmlns:p14="http://schemas.microsoft.com/office/powerpoint/2010/main" val="439305989"/>
+      </p:ext>
+    </p:extLst>
+  </p:cSld>
+  <p:clrMapOvr>
+    <a:masterClrMapping/>
+  </p:clrMapOvr>
+  <p:timing>
+    <p:tnLst>
+      <p:par>
+        <p:cTn id="1" dur="indefinite" restart="never" nodeType="tmRoot"/>
+      </p:par>
+    </p:tnLst>
+  </p:timing>
+</p:sld>
+</file>
+
 <file path=ppt/slides/slide2.xml><?xml version="1.0" encoding="utf-8"?>
 <p:sld xmlns:a="http://schemas.openxmlformats.org/drawingml/2006/main" xmlns:r="http://schemas.openxmlformats.org/officeDocument/2006/relationships" xmlns:p="http://schemas.openxmlformats.org/presentationml/2006/main">
   <p:cSld>
@@ -6653,106 +7092,331 @@
           </a:p>
         </p:txBody>
       </p:sp>
-      <p:grpSp>
-        <p:nvGrpSpPr>
-          <p:cNvPr id="8" name="Group 7"/>
-          <p:cNvGrpSpPr/>
+      <p:sp>
+        <p:nvSpPr>
+          <p:cNvPr id="7" name="Rectangle 6"/>
+          <p:cNvSpPr/>
           <p:nvPr/>
-        </p:nvGrpSpPr>
-        <p:grpSpPr>
+        </p:nvSpPr>
+        <p:spPr>
           <a:xfrm>
-            <a:off x="0" y="1378157"/>
-            <a:ext cx="9144000" cy="5153183"/>
-            <a:chOff x="0" y="1419101"/>
-            <a:chExt cx="9144000" cy="5153183"/>
+            <a:off x="0" y="6172174"/>
+            <a:ext cx="9144000" cy="707886"/>
           </a:xfrm>
-        </p:grpSpPr>
-        <p:pic>
-          <p:nvPicPr>
-            <p:cNvPr id="2052" name="Picture 4"/>
-            <p:cNvPicPr>
-              <a:picLocks noChangeAspect="1" noChangeArrowheads="1"/>
-            </p:cNvPicPr>
-            <p:nvPr/>
-          </p:nvPicPr>
-          <p:blipFill rotWithShape="1">
-            <a:blip r:embed="rId2">
-              <a:extLst>
-                <a:ext uri="{28A0092B-C50C-407E-A947-70E740481C1C}">
-                  <a14:useLocalDpi xmlns:a14="http://schemas.microsoft.com/office/drawing/2010/main" val="0"/>
-                </a:ext>
-              </a:extLst>
-            </a:blip>
-            <a:srcRect t="565"/>
-            <a:stretch/>
-          </p:blipFill>
-          <p:spPr bwMode="auto">
-            <a:xfrm>
-              <a:off x="354251" y="1419101"/>
-              <a:ext cx="8435498" cy="4753073"/>
-            </a:xfrm>
-            <a:prstGeom prst="rect">
-              <a:avLst/>
-            </a:prstGeom>
-            <a:noFill/>
-            <a:ln>
-              <a:noFill/>
-            </a:ln>
+          <a:prstGeom prst="rect">
+            <a:avLst/>
+          </a:prstGeom>
+        </p:spPr>
+        <p:txBody>
+          <a:bodyPr wrap="square">
+            <a:spAutoFit/>
+          </a:bodyPr>
+          <a:lstStyle/>
+          <a:p>
+            <a:pPr algn="ctr">
+              <a:spcBef>
+                <a:spcPts val="0"/>
+              </a:spcBef>
+            </a:pPr>
+            <a:r>
+              <a:rPr lang="en-US" sz="2000" dirty="0"/>
+              <a:t>Setup for the hooking up 3.5mm Audio Jack to the MSP430 Launchpad Board</a:t>
+            </a:r>
+          </a:p>
+          <a:p>
+            <a:pPr algn="ctr">
+              <a:spcBef>
+                <a:spcPts val="0"/>
+              </a:spcBef>
+            </a:pPr>
+            <a:r>
+              <a:rPr lang="en-US" sz="2000" dirty="0" smtClean="0"/>
+              <a:t>without </a:t>
+            </a:r>
+            <a:r>
+              <a:rPr lang="en-US" sz="2000" dirty="0"/>
+              <a:t>Volume Control</a:t>
+            </a:r>
+            <a:endParaRPr lang="en-US" sz="2000" dirty="0"/>
+          </a:p>
+        </p:txBody>
+      </p:sp>
+      <p:pic>
+        <p:nvPicPr>
+          <p:cNvPr id="1026" name="Picture 2"/>
+          <p:cNvPicPr>
+            <a:picLocks noChangeAspect="1" noChangeArrowheads="1"/>
+          </p:cNvPicPr>
+          <p:nvPr/>
+        </p:nvPicPr>
+        <p:blipFill>
+          <a:blip r:embed="rId2">
             <a:extLst>
-              <a:ext uri="{909E8E84-426E-40DD-AFC4-6F175D3DCCD1}">
-                <a14:hiddenFill xmlns:a14="http://schemas.microsoft.com/office/drawing/2010/main">
-                  <a:solidFill>
-                    <a:schemeClr val="accent1"/>
-                  </a:solidFill>
-                </a14:hiddenFill>
-              </a:ext>
-              <a:ext uri="{91240B29-F687-4F45-9708-019B960494DF}">
-                <a14:hiddenLine xmlns:a14="http://schemas.microsoft.com/office/drawing/2010/main" w="9525">
-                  <a:solidFill>
-                    <a:schemeClr val="tx1"/>
-                  </a:solidFill>
-                  <a:miter lim="800000"/>
-                  <a:headEnd/>
-                  <a:tailEnd/>
-                </a14:hiddenLine>
+              <a:ext uri="{28A0092B-C50C-407E-A947-70E740481C1C}">
+                <a14:useLocalDpi xmlns:a14="http://schemas.microsoft.com/office/drawing/2010/main" val="0"/>
               </a:ext>
             </a:extLst>
-          </p:spPr>
-        </p:pic>
-        <p:sp>
-          <p:nvSpPr>
-            <p:cNvPr id="7" name="Rectangle 6"/>
-            <p:cNvSpPr/>
-            <p:nvPr/>
-          </p:nvSpPr>
-          <p:spPr>
-            <a:xfrm>
-              <a:off x="0" y="6172174"/>
-              <a:ext cx="9144000" cy="400110"/>
-            </a:xfrm>
-            <a:prstGeom prst="rect">
-              <a:avLst/>
-            </a:prstGeom>
-          </p:spPr>
-          <p:txBody>
-            <a:bodyPr wrap="square">
-              <a:spAutoFit/>
-            </a:bodyPr>
-            <a:lstStyle/>
-            <a:p>
-              <a:pPr algn="ctr"/>
-              <a:r>
-                <a:rPr lang="en-US" sz="2000" dirty="0"/>
-                <a:t>Setup for the hooking up 3.5mm Audio Jack to the MSP430 Launchpad Board</a:t>
-              </a:r>
-            </a:p>
-          </p:txBody>
-        </p:sp>
-      </p:grpSp>
+          </a:blip>
+          <a:srcRect/>
+          <a:stretch>
+            <a:fillRect/>
+          </a:stretch>
+        </p:blipFill>
+        <p:spPr bwMode="auto">
+          <a:xfrm>
+            <a:off x="354251" y="1385334"/>
+            <a:ext cx="8435498" cy="4769734"/>
+          </a:xfrm>
+          <a:prstGeom prst="rect">
+            <a:avLst/>
+          </a:prstGeom>
+          <a:noFill/>
+          <a:ln>
+            <a:noFill/>
+          </a:ln>
+          <a:extLst>
+            <a:ext uri="{909E8E84-426E-40DD-AFC4-6F175D3DCCD1}">
+              <a14:hiddenFill xmlns:a14="http://schemas.microsoft.com/office/drawing/2010/main">
+                <a:solidFill>
+                  <a:schemeClr val="accent1"/>
+                </a:solidFill>
+              </a14:hiddenFill>
+            </a:ext>
+            <a:ext uri="{91240B29-F687-4F45-9708-019B960494DF}">
+              <a14:hiddenLine xmlns:a14="http://schemas.microsoft.com/office/drawing/2010/main" w="9525">
+                <a:solidFill>
+                  <a:schemeClr val="tx1"/>
+                </a:solidFill>
+                <a:miter lim="800000"/>
+                <a:headEnd/>
+                <a:tailEnd/>
+              </a14:hiddenLine>
+            </a:ext>
+          </a:extLst>
+        </p:spPr>
+      </p:pic>
     </p:spTree>
     <p:extLst>
       <p:ext uri="{BB962C8B-B14F-4D97-AF65-F5344CB8AC3E}">
         <p14:creationId xmlns:p14="http://schemas.microsoft.com/office/powerpoint/2010/main" val="2210947330"/>
+      </p:ext>
+    </p:extLst>
+  </p:cSld>
+  <p:clrMapOvr>
+    <a:masterClrMapping/>
+  </p:clrMapOvr>
+  <p:timing>
+    <p:tnLst>
+      <p:par>
+        <p:cTn id="1" dur="indefinite" restart="never" nodeType="tmRoot"/>
+      </p:par>
+    </p:tnLst>
+  </p:timing>
+</p:sld>
+</file>
+
+<file path=ppt/slides/slide9.xml><?xml version="1.0" encoding="utf-8"?>
+<p:sld xmlns:a="http://schemas.openxmlformats.org/drawingml/2006/main" xmlns:r="http://schemas.openxmlformats.org/officeDocument/2006/relationships" xmlns:p="http://schemas.openxmlformats.org/presentationml/2006/main">
+  <p:cSld>
+    <p:spTree>
+      <p:nvGrpSpPr>
+        <p:cNvPr id="1" name=""/>
+        <p:cNvGrpSpPr/>
+        <p:nvPr/>
+      </p:nvGrpSpPr>
+      <p:grpSpPr>
+        <a:xfrm>
+          <a:off x="0" y="0"/>
+          <a:ext cx="0" cy="0"/>
+          <a:chOff x="0" y="0"/>
+          <a:chExt cx="0" cy="0"/>
+        </a:xfrm>
+      </p:grpSpPr>
+      <p:sp>
+        <p:nvSpPr>
+          <p:cNvPr id="2" name="Title 1"/>
+          <p:cNvSpPr>
+            <a:spLocks noGrp="1"/>
+          </p:cNvSpPr>
+          <p:nvPr>
+            <p:ph type="title"/>
+          </p:nvPr>
+        </p:nvSpPr>
+        <p:spPr/>
+        <p:txBody>
+          <a:bodyPr/>
+          <a:lstStyle/>
+          <a:p>
+            <a:r>
+              <a:rPr lang="en-US" dirty="0" smtClean="0"/>
+              <a:t>In-Class Programming Exercise </a:t>
+            </a:r>
+            <a:endParaRPr lang="en-US" dirty="0"/>
+          </a:p>
+        </p:txBody>
+      </p:sp>
+      <p:sp>
+        <p:nvSpPr>
+          <p:cNvPr id="3" name="Content Placeholder 2"/>
+          <p:cNvSpPr>
+            <a:spLocks noGrp="1"/>
+          </p:cNvSpPr>
+          <p:nvPr>
+            <p:ph idx="1"/>
+          </p:nvPr>
+        </p:nvSpPr>
+        <p:spPr/>
+        <p:txBody>
+          <a:bodyPr/>
+          <a:lstStyle/>
+          <a:p>
+            <a:endParaRPr lang="en-US" sz="1800" dirty="0"/>
+          </a:p>
+        </p:txBody>
+      </p:sp>
+      <p:sp>
+        <p:nvSpPr>
+          <p:cNvPr id="4" name="Rectangle 3"/>
+          <p:cNvSpPr/>
+          <p:nvPr/>
+        </p:nvSpPr>
+        <p:spPr>
+          <a:xfrm>
+            <a:off x="3141480" y="659685"/>
+            <a:ext cx="2861040" cy="461665"/>
+          </a:xfrm>
+          <a:prstGeom prst="rect">
+            <a:avLst/>
+          </a:prstGeom>
+        </p:spPr>
+        <p:txBody>
+          <a:bodyPr wrap="none">
+            <a:spAutoFit/>
+          </a:bodyPr>
+          <a:lstStyle/>
+          <a:p>
+            <a:r>
+              <a:rPr lang="en-US" dirty="0"/>
+              <a:t>(see </a:t>
+            </a:r>
+            <a:r>
+              <a:rPr lang="en-US" dirty="0" err="1"/>
+              <a:t>interruptTones.c</a:t>
+            </a:r>
+            <a:r>
+              <a:rPr lang="en-US" dirty="0"/>
+              <a:t>)</a:t>
+            </a:r>
+          </a:p>
+        </p:txBody>
+      </p:sp>
+      <p:sp>
+        <p:nvSpPr>
+          <p:cNvPr id="7" name="Rectangle 6"/>
+          <p:cNvSpPr/>
+          <p:nvPr/>
+        </p:nvSpPr>
+        <p:spPr>
+          <a:xfrm>
+            <a:off x="0" y="6172174"/>
+            <a:ext cx="9144000" cy="707886"/>
+          </a:xfrm>
+          <a:prstGeom prst="rect">
+            <a:avLst/>
+          </a:prstGeom>
+        </p:spPr>
+        <p:txBody>
+          <a:bodyPr wrap="square">
+            <a:spAutoFit/>
+          </a:bodyPr>
+          <a:lstStyle/>
+          <a:p>
+            <a:pPr algn="ctr">
+              <a:spcBef>
+                <a:spcPts val="0"/>
+              </a:spcBef>
+            </a:pPr>
+            <a:r>
+              <a:rPr lang="en-US" sz="2000" dirty="0"/>
+              <a:t>Setup for the hooking up 3.5mm Audio Jack to the MSP430 Launchpad Board</a:t>
+            </a:r>
+          </a:p>
+          <a:p>
+            <a:pPr algn="ctr">
+              <a:spcBef>
+                <a:spcPts val="0"/>
+              </a:spcBef>
+            </a:pPr>
+            <a:r>
+              <a:rPr lang="en-US" sz="2000" dirty="0" smtClean="0"/>
+              <a:t>without </a:t>
+            </a:r>
+            <a:r>
+              <a:rPr lang="en-US" sz="2000" dirty="0"/>
+              <a:t>Volume Control</a:t>
+            </a:r>
+            <a:endParaRPr lang="en-US" sz="2000" dirty="0"/>
+          </a:p>
+        </p:txBody>
+      </p:sp>
+      <p:pic>
+        <p:nvPicPr>
+          <p:cNvPr id="3074" name="Picture 2"/>
+          <p:cNvPicPr>
+            <a:picLocks noChangeAspect="1" noChangeArrowheads="1"/>
+          </p:cNvPicPr>
+          <p:nvPr/>
+        </p:nvPicPr>
+        <p:blipFill>
+          <a:blip r:embed="rId2">
+            <a:extLst>
+              <a:ext uri="{28A0092B-C50C-407E-A947-70E740481C1C}">
+                <a14:useLocalDpi xmlns:a14="http://schemas.microsoft.com/office/drawing/2010/main" val="0"/>
+              </a:ext>
+            </a:extLst>
+          </a:blip>
+          <a:srcRect/>
+          <a:stretch>
+            <a:fillRect/>
+          </a:stretch>
+        </p:blipFill>
+        <p:spPr bwMode="auto">
+          <a:xfrm>
+            <a:off x="609600" y="1450223"/>
+            <a:ext cx="7924800" cy="4667250"/>
+          </a:xfrm>
+          <a:prstGeom prst="rect">
+            <a:avLst/>
+          </a:prstGeom>
+          <a:noFill/>
+          <a:ln>
+            <a:noFill/>
+          </a:ln>
+          <a:extLst>
+            <a:ext uri="{909E8E84-426E-40DD-AFC4-6F175D3DCCD1}">
+              <a14:hiddenFill xmlns:a14="http://schemas.microsoft.com/office/drawing/2010/main">
+                <a:solidFill>
+                  <a:schemeClr val="accent1"/>
+                </a:solidFill>
+              </a14:hiddenFill>
+            </a:ext>
+            <a:ext uri="{91240B29-F687-4F45-9708-019B960494DF}">
+              <a14:hiddenLine xmlns:a14="http://schemas.microsoft.com/office/drawing/2010/main" w="9525">
+                <a:solidFill>
+                  <a:schemeClr val="tx1"/>
+                </a:solidFill>
+                <a:miter lim="800000"/>
+                <a:headEnd/>
+                <a:tailEnd/>
+              </a14:hiddenLine>
+            </a:ext>
+          </a:extLst>
+        </p:spPr>
+      </p:pic>
+    </p:spTree>
+    <p:extLst>
+      <p:ext uri="{BB962C8B-B14F-4D97-AF65-F5344CB8AC3E}">
+        <p14:creationId xmlns:p14="http://schemas.microsoft.com/office/powerpoint/2010/main" val="3658112820"/>
       </p:ext>
     </p:extLst>
   </p:cSld>

</xml_diff>